<commit_message>
Actualización de presentación con la inclusión de graficas que se encuentran en los anexos
</commit_message>
<xml_diff>
--- a/PresentaciónChatBotNomina.pptx
+++ b/PresentaciónChatBotNomina.pptx
@@ -7,10 +7,10 @@
     <p:sldMasterId id="2147494622" r:id="rId6"/>
   </p:sldMasterIdLst>
   <p:notesMasterIdLst>
-    <p:notesMasterId r:id="rId22"/>
+    <p:notesMasterId r:id="rId23"/>
   </p:notesMasterIdLst>
   <p:handoutMasterIdLst>
-    <p:handoutMasterId r:id="rId23"/>
+    <p:handoutMasterId r:id="rId24"/>
   </p:handoutMasterIdLst>
   <p:sldIdLst>
     <p:sldId id="548" r:id="rId7"/>
@@ -21,13 +21,14 @@
     <p:sldId id="553" r:id="rId12"/>
     <p:sldId id="554" r:id="rId13"/>
     <p:sldId id="555" r:id="rId14"/>
-    <p:sldId id="556" r:id="rId15"/>
-    <p:sldId id="557" r:id="rId16"/>
-    <p:sldId id="558" r:id="rId17"/>
-    <p:sldId id="559" r:id="rId18"/>
-    <p:sldId id="560" r:id="rId19"/>
-    <p:sldId id="561" r:id="rId20"/>
-    <p:sldId id="562" r:id="rId21"/>
+    <p:sldId id="563" r:id="rId15"/>
+    <p:sldId id="556" r:id="rId16"/>
+    <p:sldId id="557" r:id="rId17"/>
+    <p:sldId id="558" r:id="rId18"/>
+    <p:sldId id="559" r:id="rId19"/>
+    <p:sldId id="560" r:id="rId20"/>
+    <p:sldId id="561" r:id="rId21"/>
+    <p:sldId id="562" r:id="rId22"/>
   </p:sldIdLst>
   <p:sldSz cx="12188825" cy="6858000"/>
   <p:notesSz cx="6858000" cy="9144000"/>
@@ -178,6 +179,90 @@
 </p:presentation>
 </file>
 
+<file path=ppt/revisionInfo.xml><?xml version="1.0" encoding="utf-8"?>
+<p1510:revInfo xmlns:a="http://schemas.openxmlformats.org/drawingml/2006/main" xmlns:r="http://schemas.openxmlformats.org/officeDocument/2006/relationships" xmlns:p1510="http://schemas.microsoft.com/office/powerpoint/2015/10/main">
+  <p1510:revLst>
+    <p1510:client id="{A6A89D3D-1ED3-42ED-84DE-08B2D02CF096}" v="2" dt="2025-05-31T15:37:01.955"/>
+  </p1510:revLst>
+</p1510:revInfo>
+</file>
+
+<file path=ppt/changesInfos/changesInfo1.xml><?xml version="1.0" encoding="utf-8"?>
+<pc:chgInfo xmlns:a="http://schemas.openxmlformats.org/drawingml/2006/main" xmlns:r="http://schemas.openxmlformats.org/officeDocument/2006/relationships" xmlns:ac="http://schemas.microsoft.com/office/drawing/2013/main/command" xmlns:pc="http://schemas.microsoft.com/office/powerpoint/2013/main/command">
+  <pc:docChgLst>
+    <pc:chgData name="Arlex Pino Aguirre" userId="9516584b-b685-44c6-8ade-aa4f379b388b" providerId="ADAL" clId="{A6A89D3D-1ED3-42ED-84DE-08B2D02CF096}"/>
+    <pc:docChg chg="custSel addSld modSld">
+      <pc:chgData name="Arlex Pino Aguirre" userId="9516584b-b685-44c6-8ade-aa4f379b388b" providerId="ADAL" clId="{A6A89D3D-1ED3-42ED-84DE-08B2D02CF096}" dt="2025-05-31T15:37:08.317" v="30" actId="20577"/>
+      <pc:docMkLst>
+        <pc:docMk/>
+      </pc:docMkLst>
+      <pc:sldChg chg="addSp delSp modSp mod">
+        <pc:chgData name="Arlex Pino Aguirre" userId="9516584b-b685-44c6-8ade-aa4f379b388b" providerId="ADAL" clId="{A6A89D3D-1ED3-42ED-84DE-08B2D02CF096}" dt="2025-05-31T15:36:29.675" v="6" actId="1076"/>
+        <pc:sldMkLst>
+          <pc:docMk/>
+          <pc:sldMk cId="4045817240" sldId="552"/>
+        </pc:sldMkLst>
+        <pc:spChg chg="mod">
+          <ac:chgData name="Arlex Pino Aguirre" userId="9516584b-b685-44c6-8ade-aa4f379b388b" providerId="ADAL" clId="{A6A89D3D-1ED3-42ED-84DE-08B2D02CF096}" dt="2025-05-31T15:35:59.674" v="1" actId="404"/>
+          <ac:spMkLst>
+            <pc:docMk/>
+            <pc:sldMk cId="4045817240" sldId="552"/>
+            <ac:spMk id="4" creationId="{9518F5C3-47BE-CA82-A007-1F810A0CE480}"/>
+          </ac:spMkLst>
+        </pc:spChg>
+        <pc:picChg chg="add mod">
+          <ac:chgData name="Arlex Pino Aguirre" userId="9516584b-b685-44c6-8ade-aa4f379b388b" providerId="ADAL" clId="{A6A89D3D-1ED3-42ED-84DE-08B2D02CF096}" dt="2025-05-31T15:36:29.675" v="6" actId="1076"/>
+          <ac:picMkLst>
+            <pc:docMk/>
+            <pc:sldMk cId="4045817240" sldId="552"/>
+            <ac:picMk id="6" creationId="{6F737CEE-AC53-3D28-BD62-9D352380269D}"/>
+          </ac:picMkLst>
+        </pc:picChg>
+        <pc:picChg chg="del">
+          <ac:chgData name="Arlex Pino Aguirre" userId="9516584b-b685-44c6-8ade-aa4f379b388b" providerId="ADAL" clId="{A6A89D3D-1ED3-42ED-84DE-08B2D02CF096}" dt="2025-05-31T15:36:02.194" v="2" actId="478"/>
+          <ac:picMkLst>
+            <pc:docMk/>
+            <pc:sldMk cId="4045817240" sldId="552"/>
+            <ac:picMk id="7" creationId="{65567A9A-9021-F6F4-1CD2-A92104CC25E3}"/>
+          </ac:picMkLst>
+        </pc:picChg>
+      </pc:sldChg>
+      <pc:sldChg chg="addSp delSp modSp new mod">
+        <pc:chgData name="Arlex Pino Aguirre" userId="9516584b-b685-44c6-8ade-aa4f379b388b" providerId="ADAL" clId="{A6A89D3D-1ED3-42ED-84DE-08B2D02CF096}" dt="2025-05-31T15:37:08.317" v="30" actId="20577"/>
+        <pc:sldMkLst>
+          <pc:docMk/>
+          <pc:sldMk cId="1350728" sldId="563"/>
+        </pc:sldMkLst>
+        <pc:spChg chg="del">
+          <ac:chgData name="Arlex Pino Aguirre" userId="9516584b-b685-44c6-8ade-aa4f379b388b" providerId="ADAL" clId="{A6A89D3D-1ED3-42ED-84DE-08B2D02CF096}" dt="2025-05-31T15:36:57.185" v="8" actId="478"/>
+          <ac:spMkLst>
+            <pc:docMk/>
+            <pc:sldMk cId="1350728" sldId="563"/>
+            <ac:spMk id="4" creationId="{5FAB9AB2-0B27-471E-38DB-0453BB99DDA6}"/>
+          </ac:spMkLst>
+        </pc:spChg>
+        <pc:spChg chg="mod">
+          <ac:chgData name="Arlex Pino Aguirre" userId="9516584b-b685-44c6-8ade-aa4f379b388b" providerId="ADAL" clId="{A6A89D3D-1ED3-42ED-84DE-08B2D02CF096}" dt="2025-05-31T15:37:08.317" v="30" actId="20577"/>
+          <ac:spMkLst>
+            <pc:docMk/>
+            <pc:sldMk cId="1350728" sldId="563"/>
+            <ac:spMk id="5" creationId="{BBA7839E-85C9-EB9C-4099-C12E4867BDD2}"/>
+          </ac:spMkLst>
+        </pc:spChg>
+        <pc:picChg chg="add mod">
+          <ac:chgData name="Arlex Pino Aguirre" userId="9516584b-b685-44c6-8ade-aa4f379b388b" providerId="ADAL" clId="{A6A89D3D-1ED3-42ED-84DE-08B2D02CF096}" dt="2025-05-31T15:37:03.516" v="10" actId="1076"/>
+          <ac:picMkLst>
+            <pc:docMk/>
+            <pc:sldMk cId="1350728" sldId="563"/>
+            <ac:picMk id="6" creationId="{996F3551-F312-C02E-0C30-563646718CE6}"/>
+          </ac:picMkLst>
+        </pc:picChg>
+      </pc:sldChg>
+    </pc:docChg>
+  </pc:docChgLst>
+</pc:chgInfo>
+</file>
+
 <file path=ppt/handoutMasters/handoutMaster1.xml><?xml version="1.0" encoding="utf-8"?>
 <p:handoutMaster xmlns:a="http://schemas.openxmlformats.org/drawingml/2006/main" xmlns:r="http://schemas.openxmlformats.org/officeDocument/2006/relationships" xmlns:p="http://schemas.openxmlformats.org/presentationml/2006/main">
   <p:cSld>
@@ -288,7 +373,7 @@
               <a:pPr>
                 <a:defRPr/>
               </a:pPr>
-              <a:t>5/30/2025</a:t>
+              <a:t>5/31/2025</a:t>
             </a:fld>
             <a:endParaRPr lang="en-US"/>
           </a:p>
@@ -507,7 +592,7 @@
               <a:pPr>
                 <a:defRPr/>
               </a:pPr>
-              <a:t>5/30/2025</a:t>
+              <a:t>5/31/2025</a:t>
             </a:fld>
             <a:endParaRPr lang="en-US"/>
           </a:p>
@@ -1841,7 +1926,7 @@
             <a:fld id="{0389DF86-9CF7-644A-ABC2-A5C2ED969516}" type="datetimeFigureOut">
               <a:rPr lang="es-CO" smtClean="0"/>
               <a:pPr/>
-              <a:t>30/05/2025</a:t>
+              <a:t>31/05/2025</a:t>
             </a:fld>
             <a:endParaRPr lang="es-CO"/>
           </a:p>
@@ -2212,7 +2297,7 @@
             <a:fld id="{0389DF86-9CF7-644A-ABC2-A5C2ED969516}" type="datetimeFigureOut">
               <a:rPr lang="es-CO" smtClean="0"/>
               <a:pPr/>
-              <a:t>30/05/2025</a:t>
+              <a:t>31/05/2025</a:t>
             </a:fld>
             <a:endParaRPr lang="es-CO"/>
           </a:p>
@@ -2901,7 +2986,7 @@
             <a:fld id="{0389DF86-9CF7-644A-ABC2-A5C2ED969516}" type="datetimeFigureOut">
               <a:rPr lang="es-CO" smtClean="0"/>
               <a:pPr/>
-              <a:t>30/05/2025</a:t>
+              <a:t>31/05/2025</a:t>
             </a:fld>
             <a:endParaRPr lang="es-CO"/>
           </a:p>
@@ -3859,7 +3944,7 @@
             <a:fld id="{0389DF86-9CF7-644A-ABC2-A5C2ED969516}" type="datetimeFigureOut">
               <a:rPr lang="es-CO" smtClean="0"/>
               <a:pPr/>
-              <a:t>30/05/2025</a:t>
+              <a:t>31/05/2025</a:t>
             </a:fld>
             <a:endParaRPr lang="es-CO"/>
           </a:p>
@@ -4677,7 +4762,7 @@
             <a:fld id="{0389DF86-9CF7-644A-ABC2-A5C2ED969516}" type="datetimeFigureOut">
               <a:rPr lang="es-CO" smtClean="0"/>
               <a:pPr/>
-              <a:t>30/05/2025</a:t>
+              <a:t>31/05/2025</a:t>
             </a:fld>
             <a:endParaRPr lang="es-CO"/>
           </a:p>
@@ -5481,7 +5566,7 @@
             <a:fld id="{0389DF86-9CF7-644A-ABC2-A5C2ED969516}" type="datetimeFigureOut">
               <a:rPr lang="es-CO" smtClean="0"/>
               <a:pPr/>
-              <a:t>30/05/2025</a:t>
+              <a:t>31/05/2025</a:t>
             </a:fld>
             <a:endParaRPr lang="es-CO"/>
           </a:p>
@@ -6237,7 +6322,7 @@
             <a:fld id="{0389DF86-9CF7-644A-ABC2-A5C2ED969516}" type="datetimeFigureOut">
               <a:rPr lang="es-CO" smtClean="0"/>
               <a:pPr/>
-              <a:t>30/05/2025</a:t>
+              <a:t>31/05/2025</a:t>
             </a:fld>
             <a:endParaRPr lang="es-CO"/>
           </a:p>
@@ -6414,7 +6499,7 @@
             <a:fld id="{0389DF86-9CF7-644A-ABC2-A5C2ED969516}" type="datetimeFigureOut">
               <a:rPr lang="es-CO" smtClean="0"/>
               <a:pPr/>
-              <a:t>30/05/2025</a:t>
+              <a:t>31/05/2025</a:t>
             </a:fld>
             <a:endParaRPr lang="es-CO"/>
           </a:p>
@@ -9820,7 +9905,7 @@
             <a:fld id="{0389DF86-9CF7-644A-ABC2-A5C2ED969516}" type="datetimeFigureOut">
               <a:rPr lang="es-CO" smtClean="0"/>
               <a:pPr/>
-              <a:t>30/05/2025</a:t>
+              <a:t>31/05/2025</a:t>
             </a:fld>
             <a:endParaRPr lang="es-CO"/>
           </a:p>
@@ -10299,10 +10384,10 @@
       </p:grpSpPr>
       <p:sp>
         <p:nvSpPr>
-          <p:cNvPr id="2" name="Título 1">
-            <a:extLst>
-              <a:ext uri="{FF2B5EF4-FFF2-40B4-BE49-F238E27FC236}">
-                <a16:creationId xmlns:a16="http://schemas.microsoft.com/office/drawing/2014/main" id="{A701AEAA-863C-B44E-4986-F48A89E26D10}"/>
+          <p:cNvPr id="3" name="Título 2">
+            <a:extLst>
+              <a:ext uri="{FF2B5EF4-FFF2-40B4-BE49-F238E27FC236}">
+                <a16:creationId xmlns:a16="http://schemas.microsoft.com/office/drawing/2014/main" id="{0B96A6D9-91EA-0394-CC6D-6C90A710047A}"/>
               </a:ext>
             </a:extLst>
           </p:cNvPr>
@@ -10320,17 +10405,17 @@
           <a:p>
             <a:r>
               <a:rPr lang="es-MX" dirty="0"/>
-              <a:t>Desempeño bajo carga</a:t>
-            </a:r>
-          </a:p>
-        </p:txBody>
-      </p:sp>
-      <p:sp>
-        <p:nvSpPr>
-          <p:cNvPr id="3" name="Marcador de texto 2">
-            <a:extLst>
-              <a:ext uri="{FF2B5EF4-FFF2-40B4-BE49-F238E27FC236}">
-                <a16:creationId xmlns:a16="http://schemas.microsoft.com/office/drawing/2014/main" id="{E205073F-EDFF-F523-E7E6-C62EB830B4F7}"/>
+              <a:t>Evaluación: Métricas y Resultados</a:t>
+            </a:r>
+          </a:p>
+        </p:txBody>
+      </p:sp>
+      <p:sp>
+        <p:nvSpPr>
+          <p:cNvPr id="4" name="Marcador de texto 3">
+            <a:extLst>
+              <a:ext uri="{FF2B5EF4-FFF2-40B4-BE49-F238E27FC236}">
+                <a16:creationId xmlns:a16="http://schemas.microsoft.com/office/drawing/2014/main" id="{4A11DB47-998D-7A1E-E149-B28298ED46A5}"/>
               </a:ext>
             </a:extLst>
           </p:cNvPr>
@@ -10341,83 +10426,91 @@
             <p:ph type="body" sz="quarter" idx="12"/>
           </p:nvPr>
         </p:nvSpPr>
-        <p:spPr/>
+        <p:spPr>
+          <a:xfrm>
+            <a:off x="7036136" y="1586132"/>
+            <a:ext cx="5058164" cy="3685735"/>
+          </a:xfrm>
+        </p:spPr>
         <p:txBody>
           <a:bodyPr/>
           <a:lstStyle/>
           <a:p>
-            <a:pPr marL="342900" indent="-342900">
-              <a:buFont typeface="Arial" panose="020B0604020202020204" pitchFamily="34" charset="0"/>
-              <a:buChar char="•"/>
-            </a:pPr>
-            <a:r>
-              <a:rPr lang="es-MX" dirty="0"/>
-              <a:t>Hasta 100 consultas simultáneas.</a:t>
-            </a:r>
-          </a:p>
-          <a:p>
-            <a:pPr marL="342900" indent="-342900">
-              <a:buFont typeface="Arial" panose="020B0604020202020204" pitchFamily="34" charset="0"/>
-              <a:buChar char="•"/>
-            </a:pPr>
-            <a:r>
-              <a:rPr lang="es-MX" dirty="0"/>
-              <a:t>Tiempo de respuesta bajo carga: 3.1 segundos.</a:t>
-            </a:r>
-          </a:p>
-          <a:p>
-            <a:pPr marL="342900" indent="-342900">
-              <a:buFont typeface="Arial" panose="020B0604020202020204" pitchFamily="34" charset="0"/>
-              <a:buChar char="•"/>
-            </a:pPr>
-            <a:r>
-              <a:rPr lang="es-MX" dirty="0"/>
-              <a:t>Uso promedio CPU: 45%.</a:t>
-            </a:r>
-          </a:p>
-          <a:p>
-            <a:pPr marL="342900" indent="-342900">
-              <a:buFont typeface="Arial" panose="020B0604020202020204" pitchFamily="34" charset="0"/>
-              <a:buChar char="•"/>
-            </a:pPr>
-            <a:r>
-              <a:rPr lang="es-MX" dirty="0"/>
-              <a:t>Uso promedio Memoria: 2.1 GB.</a:t>
-            </a:r>
-          </a:p>
-        </p:txBody>
-      </p:sp>
-      <p:sp>
-        <p:nvSpPr>
-          <p:cNvPr id="4" name="Marcador de posición de imagen 3">
-            <a:extLst>
-              <a:ext uri="{FF2B5EF4-FFF2-40B4-BE49-F238E27FC236}">
-                <a16:creationId xmlns:a16="http://schemas.microsoft.com/office/drawing/2014/main" id="{7D7C9ACD-2CA2-3542-773B-717A0DC1DF33}"/>
-              </a:ext>
-            </a:extLst>
-          </p:cNvPr>
-          <p:cNvSpPr>
-            <a:spLocks noGrp="1"/>
-          </p:cNvSpPr>
+            <a:r>
+              <a:rPr lang="es-MX" dirty="0">
+                <a:solidFill>
+                  <a:schemeClr val="bg1"/>
+                </a:solidFill>
+              </a:rPr>
+              <a:t>Precisión general: 92%.</a:t>
+            </a:r>
+          </a:p>
+          <a:p>
+            <a:r>
+              <a:rPr lang="es-MX" dirty="0">
+                <a:solidFill>
+                  <a:schemeClr val="bg1"/>
+                </a:solidFill>
+              </a:rPr>
+              <a:t>Tiempo promedio de respuesta: 2.3 segundos.</a:t>
+            </a:r>
+          </a:p>
+          <a:p>
+            <a:r>
+              <a:rPr lang="es-MX" dirty="0">
+                <a:solidFill>
+                  <a:schemeClr val="bg1"/>
+                </a:solidFill>
+              </a:rPr>
+              <a:t>Precisión tradicional: 65%, tiempo: 3.8 segundos.</a:t>
+            </a:r>
+          </a:p>
+          <a:p>
+            <a:endParaRPr lang="es-MX" dirty="0">
+              <a:solidFill>
+                <a:schemeClr val="bg1"/>
+              </a:solidFill>
+            </a:endParaRPr>
+          </a:p>
+        </p:txBody>
+      </p:sp>
+      <p:pic>
+        <p:nvPicPr>
+          <p:cNvPr id="5" name="Picture 3" descr="desempeno_comparacion.png">
+            <a:extLst>
+              <a:ext uri="{FF2B5EF4-FFF2-40B4-BE49-F238E27FC236}">
+                <a16:creationId xmlns:a16="http://schemas.microsoft.com/office/drawing/2014/main" id="{5B8AD368-4797-7BED-8863-3EE2699233FA}"/>
+              </a:ext>
+            </a:extLst>
+          </p:cNvPr>
+          <p:cNvPicPr>
+            <a:picLocks noGrp="1" noChangeAspect="1"/>
+          </p:cNvPicPr>
           <p:nvPr>
             <p:ph type="pic" sz="quarter" idx="13"/>
           </p:nvPr>
-        </p:nvSpPr>
-        <p:spPr/>
-        <p:txBody>
-          <a:bodyPr/>
-          <a:lstStyle/>
-          <a:p>
-            <a:endParaRPr lang="es-MX"/>
-          </a:p>
-        </p:txBody>
-      </p:sp>
+        </p:nvPicPr>
+        <p:blipFill>
+          <a:blip r:embed="rId2"/>
+          <a:srcRect t="980" b="1787"/>
+          <a:stretch/>
+        </p:blipFill>
+        <p:spPr>
+          <a:xfrm>
+            <a:off x="981075" y="2413262"/>
+            <a:ext cx="5787369" cy="4006391"/>
+          </a:xfrm>
+          <a:prstGeom prst="rect">
+            <a:avLst/>
+          </a:prstGeom>
+        </p:spPr>
+      </p:pic>
       <p:pic>
         <p:nvPicPr>
-          <p:cNvPr id="5" name="Picture 3" descr="uso_recursos.png">
-            <a:extLst>
-              <a:ext uri="{FF2B5EF4-FFF2-40B4-BE49-F238E27FC236}">
-                <a16:creationId xmlns:a16="http://schemas.microsoft.com/office/drawing/2014/main" id="{BB5A2F62-88DC-19D9-3ACE-4B491CACFDDB}"/>
+          <p:cNvPr id="7" name="Imagen 6">
+            <a:extLst>
+              <a:ext uri="{FF2B5EF4-FFF2-40B4-BE49-F238E27FC236}">
+                <a16:creationId xmlns:a16="http://schemas.microsoft.com/office/drawing/2014/main" id="{712D7EBF-A0DC-1307-8779-B4DF924F5EC6}"/>
               </a:ext>
             </a:extLst>
           </p:cNvPr>
@@ -10427,15 +10520,15 @@
           <p:nvPr/>
         </p:nvPicPr>
         <p:blipFill>
-          <a:blip r:embed="rId2"/>
+          <a:blip r:embed="rId3"/>
           <a:stretch>
             <a:fillRect/>
           </a:stretch>
         </p:blipFill>
         <p:spPr>
           <a:xfrm>
-            <a:off x="6305918" y="2092750"/>
-            <a:ext cx="5814125" cy="2907063"/>
+            <a:off x="7709809" y="3933281"/>
+            <a:ext cx="3858163" cy="2486372"/>
           </a:xfrm>
           <a:prstGeom prst="rect">
             <a:avLst/>
@@ -10445,7 +10538,7 @@
     </p:spTree>
     <p:extLst>
       <p:ext uri="{BB962C8B-B14F-4D97-AF65-F5344CB8AC3E}">
-        <p14:creationId xmlns:p14="http://schemas.microsoft.com/office/powerpoint/2010/main" val="1800940129"/>
+        <p14:creationId xmlns:p14="http://schemas.microsoft.com/office/powerpoint/2010/main" val="3890542687"/>
       </p:ext>
     </p:extLst>
   </p:cSld>
@@ -10474,64 +10567,10 @@
       </p:grpSpPr>
       <p:sp>
         <p:nvSpPr>
-          <p:cNvPr id="2" name="Marcador de fecha 1">
-            <a:extLst>
-              <a:ext uri="{FF2B5EF4-FFF2-40B4-BE49-F238E27FC236}">
-                <a16:creationId xmlns:a16="http://schemas.microsoft.com/office/drawing/2014/main" id="{6ECAFDCD-6483-7150-08B1-A9D9086EB0E0}"/>
-              </a:ext>
-            </a:extLst>
-          </p:cNvPr>
-          <p:cNvSpPr>
-            <a:spLocks noGrp="1"/>
-          </p:cNvSpPr>
-          <p:nvPr>
-            <p:ph type="dt" sz="half" idx="10"/>
-          </p:nvPr>
-        </p:nvSpPr>
-        <p:spPr/>
-        <p:txBody>
-          <a:bodyPr/>
-          <a:lstStyle/>
-          <a:p>
-            <a:fld id="{D52B6CA2-4C32-4FB9-B541-22C77B5C1E8C}" type="datetime1">
-              <a:rPr lang="es-CO" smtClean="0"/>
-              <a:t>30/05/2025</a:t>
-            </a:fld>
-            <a:endParaRPr lang="es-CO"/>
-          </a:p>
-        </p:txBody>
-      </p:sp>
-      <p:sp>
-        <p:nvSpPr>
-          <p:cNvPr id="3" name="Marcador de pie de página 2">
-            <a:extLst>
-              <a:ext uri="{FF2B5EF4-FFF2-40B4-BE49-F238E27FC236}">
-                <a16:creationId xmlns:a16="http://schemas.microsoft.com/office/drawing/2014/main" id="{C4B9E64D-FC91-76F0-1F57-BFF78EF3D6DC}"/>
-              </a:ext>
-            </a:extLst>
-          </p:cNvPr>
-          <p:cNvSpPr>
-            <a:spLocks noGrp="1"/>
-          </p:cNvSpPr>
-          <p:nvPr>
-            <p:ph type="ftr" sz="quarter" idx="11"/>
-          </p:nvPr>
-        </p:nvSpPr>
-        <p:spPr/>
-        <p:txBody>
-          <a:bodyPr/>
-          <a:lstStyle/>
-          <a:p>
-            <a:endParaRPr lang="es-CO"/>
-          </a:p>
-        </p:txBody>
-      </p:sp>
-      <p:sp>
-        <p:nvSpPr>
-          <p:cNvPr id="7" name="Título 6">
-            <a:extLst>
-              <a:ext uri="{FF2B5EF4-FFF2-40B4-BE49-F238E27FC236}">
-                <a16:creationId xmlns:a16="http://schemas.microsoft.com/office/drawing/2014/main" id="{26268ECC-BB84-4E66-0A32-EE8784C8003B}"/>
+          <p:cNvPr id="2" name="Título 1">
+            <a:extLst>
+              <a:ext uri="{FF2B5EF4-FFF2-40B4-BE49-F238E27FC236}">
+                <a16:creationId xmlns:a16="http://schemas.microsoft.com/office/drawing/2014/main" id="{A701AEAA-863C-B44E-4986-F48A89E26D10}"/>
               </a:ext>
             </a:extLst>
           </p:cNvPr>
@@ -10549,17 +10588,17 @@
           <a:p>
             <a:r>
               <a:rPr lang="es-MX" dirty="0"/>
-              <a:t>Discusión</a:t>
-            </a:r>
-          </a:p>
-        </p:txBody>
-      </p:sp>
-      <p:sp>
-        <p:nvSpPr>
-          <p:cNvPr id="8" name="Marcador de texto 7">
-            <a:extLst>
-              <a:ext uri="{FF2B5EF4-FFF2-40B4-BE49-F238E27FC236}">
-                <a16:creationId xmlns:a16="http://schemas.microsoft.com/office/drawing/2014/main" id="{F3E5C1C7-7788-E964-8614-18833D88CACB}"/>
+              <a:t>Desempeño bajo carga</a:t>
+            </a:r>
+          </a:p>
+        </p:txBody>
+      </p:sp>
+      <p:sp>
+        <p:nvSpPr>
+          <p:cNvPr id="3" name="Marcador de texto 2">
+            <a:extLst>
+              <a:ext uri="{FF2B5EF4-FFF2-40B4-BE49-F238E27FC236}">
+                <a16:creationId xmlns:a16="http://schemas.microsoft.com/office/drawing/2014/main" id="{E205073F-EDFF-F523-E7E6-C62EB830B4F7}"/>
               </a:ext>
             </a:extLst>
           </p:cNvPr>
@@ -10580,12 +10619,8 @@
               <a:buChar char="•"/>
             </a:pPr>
             <a:r>
-              <a:rPr lang="es-MX" sz="3200" dirty="0" err="1"/>
-              <a:t>Embeddings</a:t>
-            </a:r>
-            <a:r>
-              <a:rPr lang="es-MX" sz="3200" dirty="0"/>
-              <a:t> mejoran precisión y contexto frente a búsquedas por palabras clave.</a:t>
+              <a:rPr lang="es-MX" dirty="0"/>
+              <a:t>Hasta 100 consultas simultáneas.</a:t>
             </a:r>
           </a:p>
           <a:p>
@@ -10594,8 +10629,8 @@
               <a:buChar char="•"/>
             </a:pPr>
             <a:r>
-              <a:rPr lang="es-MX" sz="3200" dirty="0"/>
-              <a:t>Resultados superiores a estudios similares (92% vs 85%).</a:t>
+              <a:rPr lang="es-MX" dirty="0"/>
+              <a:t>Tiempo de respuesta bajo carga: 3.1 segundos.</a:t>
             </a:r>
           </a:p>
           <a:p>
@@ -10604,8 +10639,8 @@
               <a:buChar char="•"/>
             </a:pPr>
             <a:r>
-              <a:rPr lang="es-MX" sz="3200" dirty="0"/>
-              <a:t>Limitaciones: calidad de datos, necesidad actualización modelo.</a:t>
+              <a:rPr lang="es-MX" dirty="0"/>
+              <a:t>Uso promedio CPU: 45%.</a:t>
             </a:r>
           </a:p>
           <a:p>
@@ -10614,23 +10649,71 @@
               <a:buChar char="•"/>
             </a:pPr>
             <a:r>
-              <a:rPr lang="es-MX" sz="3200" dirty="0"/>
-              <a:t>Propuesta: aprendizaje continuo para adaptabilidad.</a:t>
-            </a:r>
-          </a:p>
-          <a:p>
-            <a:pPr marL="342900" indent="-342900">
-              <a:buFont typeface="Arial" panose="020B0604020202020204" pitchFamily="34" charset="0"/>
-              <a:buChar char="•"/>
-            </a:pPr>
-            <a:endParaRPr lang="es-MX" sz="3200" dirty="0"/>
-          </a:p>
-        </p:txBody>
-      </p:sp>
+              <a:rPr lang="es-MX" dirty="0"/>
+              <a:t>Uso promedio Memoria: 2.1 GB.</a:t>
+            </a:r>
+          </a:p>
+        </p:txBody>
+      </p:sp>
+      <p:sp>
+        <p:nvSpPr>
+          <p:cNvPr id="4" name="Marcador de posición de imagen 3">
+            <a:extLst>
+              <a:ext uri="{FF2B5EF4-FFF2-40B4-BE49-F238E27FC236}">
+                <a16:creationId xmlns:a16="http://schemas.microsoft.com/office/drawing/2014/main" id="{7D7C9ACD-2CA2-3542-773B-717A0DC1DF33}"/>
+              </a:ext>
+            </a:extLst>
+          </p:cNvPr>
+          <p:cNvSpPr>
+            <a:spLocks noGrp="1"/>
+          </p:cNvSpPr>
+          <p:nvPr>
+            <p:ph type="pic" sz="quarter" idx="13"/>
+          </p:nvPr>
+        </p:nvSpPr>
+        <p:spPr/>
+        <p:txBody>
+          <a:bodyPr/>
+          <a:lstStyle/>
+          <a:p>
+            <a:endParaRPr lang="es-MX"/>
+          </a:p>
+        </p:txBody>
+      </p:sp>
+      <p:pic>
+        <p:nvPicPr>
+          <p:cNvPr id="5" name="Picture 3" descr="uso_recursos.png">
+            <a:extLst>
+              <a:ext uri="{FF2B5EF4-FFF2-40B4-BE49-F238E27FC236}">
+                <a16:creationId xmlns:a16="http://schemas.microsoft.com/office/drawing/2014/main" id="{BB5A2F62-88DC-19D9-3ACE-4B491CACFDDB}"/>
+              </a:ext>
+            </a:extLst>
+          </p:cNvPr>
+          <p:cNvPicPr>
+            <a:picLocks noChangeAspect="1"/>
+          </p:cNvPicPr>
+          <p:nvPr/>
+        </p:nvPicPr>
+        <p:blipFill>
+          <a:blip r:embed="rId2"/>
+          <a:stretch>
+            <a:fillRect/>
+          </a:stretch>
+        </p:blipFill>
+        <p:spPr>
+          <a:xfrm>
+            <a:off x="6305918" y="2092750"/>
+            <a:ext cx="5814125" cy="2907063"/>
+          </a:xfrm>
+          <a:prstGeom prst="rect">
+            <a:avLst/>
+          </a:prstGeom>
+        </p:spPr>
+      </p:pic>
     </p:spTree>
     <p:extLst>
       <p:ext uri="{BB962C8B-B14F-4D97-AF65-F5344CB8AC3E}">
-        <p14:creationId xmlns:p14="http://schemas.microsoft.com/office/powerpoint/2010/main" val="3937680224"/>
+        <p14:creationId xmlns:p14="http://schemas.microsoft.com/office/powerpoint/2010/main" val="1800940129"/>
       </p:ext>
     </p:extLst>
   </p:cSld>
@@ -10659,10 +10742,10 @@
       </p:grpSpPr>
       <p:sp>
         <p:nvSpPr>
-          <p:cNvPr id="2" name="Marcador de posición de imagen 1">
-            <a:extLst>
-              <a:ext uri="{FF2B5EF4-FFF2-40B4-BE49-F238E27FC236}">
-                <a16:creationId xmlns:a16="http://schemas.microsoft.com/office/drawing/2014/main" id="{538BED83-9504-2194-5410-B073B4FEF16B}"/>
+          <p:cNvPr id="2" name="Marcador de fecha 1">
+            <a:extLst>
+              <a:ext uri="{FF2B5EF4-FFF2-40B4-BE49-F238E27FC236}">
+                <a16:creationId xmlns:a16="http://schemas.microsoft.com/office/drawing/2014/main" id="{6ECAFDCD-6483-7150-08B1-A9D9086EB0E0}"/>
               </a:ext>
             </a:extLst>
           </p:cNvPr>
@@ -10670,7 +10753,7 @@
             <a:spLocks noGrp="1"/>
           </p:cNvSpPr>
           <p:nvPr>
-            <p:ph type="pic" sz="quarter" idx="15"/>
+            <p:ph type="dt" sz="half" idx="10"/>
           </p:nvPr>
         </p:nvSpPr>
         <p:spPr/>
@@ -10678,16 +10761,45 @@
           <a:bodyPr/>
           <a:lstStyle/>
           <a:p>
-            <a:endParaRPr lang="es-MX"/>
-          </a:p>
-        </p:txBody>
-      </p:sp>
-      <p:sp>
-        <p:nvSpPr>
-          <p:cNvPr id="3" name="Título 2">
-            <a:extLst>
-              <a:ext uri="{FF2B5EF4-FFF2-40B4-BE49-F238E27FC236}">
-                <a16:creationId xmlns:a16="http://schemas.microsoft.com/office/drawing/2014/main" id="{DBAD3B31-C9CF-ACA1-530C-D07C4E16D938}"/>
+            <a:fld id="{D52B6CA2-4C32-4FB9-B541-22C77B5C1E8C}" type="datetime1">
+              <a:rPr lang="es-CO" smtClean="0"/>
+              <a:t>31/05/2025</a:t>
+            </a:fld>
+            <a:endParaRPr lang="es-CO"/>
+          </a:p>
+        </p:txBody>
+      </p:sp>
+      <p:sp>
+        <p:nvSpPr>
+          <p:cNvPr id="3" name="Marcador de pie de página 2">
+            <a:extLst>
+              <a:ext uri="{FF2B5EF4-FFF2-40B4-BE49-F238E27FC236}">
+                <a16:creationId xmlns:a16="http://schemas.microsoft.com/office/drawing/2014/main" id="{C4B9E64D-FC91-76F0-1F57-BFF78EF3D6DC}"/>
+              </a:ext>
+            </a:extLst>
+          </p:cNvPr>
+          <p:cNvSpPr>
+            <a:spLocks noGrp="1"/>
+          </p:cNvSpPr>
+          <p:nvPr>
+            <p:ph type="ftr" sz="quarter" idx="11"/>
+          </p:nvPr>
+        </p:nvSpPr>
+        <p:spPr/>
+        <p:txBody>
+          <a:bodyPr/>
+          <a:lstStyle/>
+          <a:p>
+            <a:endParaRPr lang="es-CO"/>
+          </a:p>
+        </p:txBody>
+      </p:sp>
+      <p:sp>
+        <p:nvSpPr>
+          <p:cNvPr id="7" name="Título 6">
+            <a:extLst>
+              <a:ext uri="{FF2B5EF4-FFF2-40B4-BE49-F238E27FC236}">
+                <a16:creationId xmlns:a16="http://schemas.microsoft.com/office/drawing/2014/main" id="{26268ECC-BB84-4E66-0A32-EE8784C8003B}"/>
               </a:ext>
             </a:extLst>
           </p:cNvPr>
@@ -10705,17 +10817,17 @@
           <a:p>
             <a:r>
               <a:rPr lang="es-MX" dirty="0"/>
-              <a:t>Implicaciones Prácticas</a:t>
-            </a:r>
-          </a:p>
-        </p:txBody>
-      </p:sp>
-      <p:sp>
-        <p:nvSpPr>
-          <p:cNvPr id="4" name="Marcador de texto 3">
-            <a:extLst>
-              <a:ext uri="{FF2B5EF4-FFF2-40B4-BE49-F238E27FC236}">
-                <a16:creationId xmlns:a16="http://schemas.microsoft.com/office/drawing/2014/main" id="{4FAE729F-CEFD-3542-8936-9C0DF7E4596F}"/>
+              <a:t>Discusión</a:t>
+            </a:r>
+          </a:p>
+        </p:txBody>
+      </p:sp>
+      <p:sp>
+        <p:nvSpPr>
+          <p:cNvPr id="8" name="Marcador de texto 7">
+            <a:extLst>
+              <a:ext uri="{FF2B5EF4-FFF2-40B4-BE49-F238E27FC236}">
+                <a16:creationId xmlns:a16="http://schemas.microsoft.com/office/drawing/2014/main" id="{F3E5C1C7-7788-E964-8614-18833D88CACB}"/>
               </a:ext>
             </a:extLst>
           </p:cNvPr>
@@ -10736,8 +10848,12 @@
               <a:buChar char="•"/>
             </a:pPr>
             <a:r>
+              <a:rPr lang="es-MX" sz="3200" dirty="0" err="1"/>
+              <a:t>Embeddings</a:t>
+            </a:r>
+            <a:r>
               <a:rPr lang="es-MX" sz="3200" dirty="0"/>
-              <a:t>Aplicable a empresas de cualquier tamaño.</a:t>
+              <a:t> mejoran precisión y contexto frente a búsquedas por palabras clave.</a:t>
             </a:r>
           </a:p>
           <a:p>
@@ -10747,7 +10863,7 @@
             </a:pPr>
             <a:r>
               <a:rPr lang="es-MX" sz="3200" dirty="0"/>
-              <a:t>Seguridad reforzada con Microsoft Entra ID.</a:t>
+              <a:t>Resultados superiores a estudios similares (92% vs 85%).</a:t>
             </a:r>
           </a:p>
           <a:p>
@@ -10757,99 +10873,32 @@
             </a:pPr>
             <a:r>
               <a:rPr lang="es-MX" sz="3200" dirty="0"/>
-              <a:t>Mejora experiencia empleados y eficiencia RH.</a:t>
-            </a:r>
-          </a:p>
-        </p:txBody>
-      </p:sp>
-      <p:sp>
-        <p:nvSpPr>
-          <p:cNvPr id="5" name="Marcador de fecha 4">
-            <a:extLst>
-              <a:ext uri="{FF2B5EF4-FFF2-40B4-BE49-F238E27FC236}">
-                <a16:creationId xmlns:a16="http://schemas.microsoft.com/office/drawing/2014/main" id="{A5558EC8-446A-0A66-D5B2-125F27705568}"/>
-              </a:ext>
-            </a:extLst>
-          </p:cNvPr>
-          <p:cNvSpPr>
-            <a:spLocks noGrp="1"/>
-          </p:cNvSpPr>
-          <p:nvPr>
-            <p:ph type="dt" sz="half" idx="13"/>
-          </p:nvPr>
-        </p:nvSpPr>
-        <p:spPr/>
-        <p:txBody>
-          <a:bodyPr/>
-          <a:lstStyle/>
-          <a:p>
-            <a:fld id="{3EDC3FF3-DCBA-4A3D-ABB5-DDC87A3BC009}" type="datetime1">
-              <a:rPr lang="es-CO" smtClean="0"/>
-              <a:t>30/05/2025</a:t>
-            </a:fld>
-            <a:endParaRPr lang="es-CO"/>
-          </a:p>
-        </p:txBody>
-      </p:sp>
-      <p:sp>
-        <p:nvSpPr>
-          <p:cNvPr id="6" name="Marcador de pie de página 5">
-            <a:extLst>
-              <a:ext uri="{FF2B5EF4-FFF2-40B4-BE49-F238E27FC236}">
-                <a16:creationId xmlns:a16="http://schemas.microsoft.com/office/drawing/2014/main" id="{FB6F8A0B-45A3-1C7B-8FC1-D31C85259A04}"/>
-              </a:ext>
-            </a:extLst>
-          </p:cNvPr>
-          <p:cNvSpPr>
-            <a:spLocks noGrp="1"/>
-          </p:cNvSpPr>
-          <p:nvPr>
-            <p:ph type="ftr" sz="quarter" idx="14"/>
-          </p:nvPr>
-        </p:nvSpPr>
-        <p:spPr/>
-        <p:txBody>
-          <a:bodyPr/>
-          <a:lstStyle/>
-          <a:p>
-            <a:endParaRPr lang="es-CO" dirty="0"/>
-          </a:p>
-        </p:txBody>
-      </p:sp>
-      <p:pic>
-        <p:nvPicPr>
-          <p:cNvPr id="8" name="Picture 3" descr="beneficios_empresa.png">
-            <a:extLst>
-              <a:ext uri="{FF2B5EF4-FFF2-40B4-BE49-F238E27FC236}">
-                <a16:creationId xmlns:a16="http://schemas.microsoft.com/office/drawing/2014/main" id="{A3668CB4-6E8B-7E29-C1F6-0E2DB80F1B89}"/>
-              </a:ext>
-            </a:extLst>
-          </p:cNvPr>
-          <p:cNvPicPr>
-            <a:picLocks noChangeAspect="1"/>
-          </p:cNvPicPr>
-          <p:nvPr/>
-        </p:nvPicPr>
-        <p:blipFill>
-          <a:blip r:embed="rId2"/>
-          <a:stretch>
-            <a:fillRect/>
-          </a:stretch>
-        </p:blipFill>
-        <p:spPr>
-          <a:xfrm>
-            <a:off x="6379331" y="1924844"/>
-            <a:ext cx="5504692" cy="2752346"/>
-          </a:xfrm>
-          <a:prstGeom prst="rect">
-            <a:avLst/>
-          </a:prstGeom>
-        </p:spPr>
-      </p:pic>
+              <a:t>Limitaciones: calidad de datos, necesidad actualización modelo.</a:t>
+            </a:r>
+          </a:p>
+          <a:p>
+            <a:pPr marL="342900" indent="-342900">
+              <a:buFont typeface="Arial" panose="020B0604020202020204" pitchFamily="34" charset="0"/>
+              <a:buChar char="•"/>
+            </a:pPr>
+            <a:r>
+              <a:rPr lang="es-MX" sz="3200" dirty="0"/>
+              <a:t>Propuesta: aprendizaje continuo para adaptabilidad.</a:t>
+            </a:r>
+          </a:p>
+          <a:p>
+            <a:pPr marL="342900" indent="-342900">
+              <a:buFont typeface="Arial" panose="020B0604020202020204" pitchFamily="34" charset="0"/>
+              <a:buChar char="•"/>
+            </a:pPr>
+            <a:endParaRPr lang="es-MX" sz="3200" dirty="0"/>
+          </a:p>
+        </p:txBody>
+      </p:sp>
     </p:spTree>
     <p:extLst>
       <p:ext uri="{BB962C8B-B14F-4D97-AF65-F5344CB8AC3E}">
-        <p14:creationId xmlns:p14="http://schemas.microsoft.com/office/powerpoint/2010/main" val="3913682475"/>
+        <p14:creationId xmlns:p14="http://schemas.microsoft.com/office/powerpoint/2010/main" val="3937680224"/>
       </p:ext>
     </p:extLst>
   </p:cSld>
@@ -10878,10 +10927,10 @@
       </p:grpSpPr>
       <p:sp>
         <p:nvSpPr>
-          <p:cNvPr id="2" name="Marcador de fecha 1">
-            <a:extLst>
-              <a:ext uri="{FF2B5EF4-FFF2-40B4-BE49-F238E27FC236}">
-                <a16:creationId xmlns:a16="http://schemas.microsoft.com/office/drawing/2014/main" id="{DDFD761B-D19F-8CA1-9BD4-F4EB7009DEB7}"/>
+          <p:cNvPr id="2" name="Marcador de posición de imagen 1">
+            <a:extLst>
+              <a:ext uri="{FF2B5EF4-FFF2-40B4-BE49-F238E27FC236}">
+                <a16:creationId xmlns:a16="http://schemas.microsoft.com/office/drawing/2014/main" id="{538BED83-9504-2194-5410-B073B4FEF16B}"/>
               </a:ext>
             </a:extLst>
           </p:cNvPr>
@@ -10889,7 +10938,7 @@
             <a:spLocks noGrp="1"/>
           </p:cNvSpPr>
           <p:nvPr>
-            <p:ph type="dt" sz="half" idx="10"/>
+            <p:ph type="pic" sz="quarter" idx="15"/>
           </p:nvPr>
         </p:nvSpPr>
         <p:spPr/>
@@ -10897,20 +10946,16 @@
           <a:bodyPr/>
           <a:lstStyle/>
           <a:p>
-            <a:fld id="{9EB637D8-29A0-4E8C-B8A6-C66707785733}" type="datetime1">
-              <a:rPr lang="es-CO" smtClean="0"/>
-              <a:t>30/05/2025</a:t>
-            </a:fld>
-            <a:endParaRPr lang="es-CO"/>
-          </a:p>
-        </p:txBody>
-      </p:sp>
-      <p:sp>
-        <p:nvSpPr>
-          <p:cNvPr id="3" name="Marcador de pie de página 2">
-            <a:extLst>
-              <a:ext uri="{FF2B5EF4-FFF2-40B4-BE49-F238E27FC236}">
-                <a16:creationId xmlns:a16="http://schemas.microsoft.com/office/drawing/2014/main" id="{289877D8-29FA-CB5E-43AE-01873140A27B}"/>
+            <a:endParaRPr lang="es-MX"/>
+          </a:p>
+        </p:txBody>
+      </p:sp>
+      <p:sp>
+        <p:nvSpPr>
+          <p:cNvPr id="3" name="Título 2">
+            <a:extLst>
+              <a:ext uri="{FF2B5EF4-FFF2-40B4-BE49-F238E27FC236}">
+                <a16:creationId xmlns:a16="http://schemas.microsoft.com/office/drawing/2014/main" id="{DBAD3B31-C9CF-ACA1-530C-D07C4E16D938}"/>
               </a:ext>
             </a:extLst>
           </p:cNvPr>
@@ -10918,7 +10963,7 @@
             <a:spLocks noGrp="1"/>
           </p:cNvSpPr>
           <p:nvPr>
-            <p:ph type="ftr" sz="quarter" idx="11"/>
+            <p:ph type="title"/>
           </p:nvPr>
         </p:nvSpPr>
         <p:spPr/>
@@ -10926,7 +10971,10 @@
           <a:bodyPr/>
           <a:lstStyle/>
           <a:p>
-            <a:endParaRPr lang="es-CO"/>
+            <a:r>
+              <a:rPr lang="es-MX" dirty="0"/>
+              <a:t>Implicaciones Prácticas</a:t>
+            </a:r>
           </a:p>
         </p:txBody>
       </p:sp>
@@ -10935,7 +10983,7 @@
           <p:cNvPr id="4" name="Marcador de texto 3">
             <a:extLst>
               <a:ext uri="{FF2B5EF4-FFF2-40B4-BE49-F238E27FC236}">
-                <a16:creationId xmlns:a16="http://schemas.microsoft.com/office/drawing/2014/main" id="{6866D828-883D-E7A2-96C9-549CB32DF939}"/>
+                <a16:creationId xmlns:a16="http://schemas.microsoft.com/office/drawing/2014/main" id="{4FAE729F-CEFD-3542-8936-9C0DF7E4596F}"/>
               </a:ext>
             </a:extLst>
           </p:cNvPr>
@@ -10957,7 +11005,7 @@
             </a:pPr>
             <a:r>
               <a:rPr lang="es-MX" sz="3200" dirty="0"/>
-              <a:t>Chatbot eficaz para automatizar consultas de nómina.</a:t>
+              <a:t>Aplicable a empresas de cualquier tamaño.</a:t>
             </a:r>
           </a:p>
           <a:p>
@@ -10967,15 +11015,7 @@
             </a:pPr>
             <a:r>
               <a:rPr lang="es-MX" sz="3200" dirty="0"/>
-              <a:t>Integración de PLN y </a:t>
-            </a:r>
-            <a:r>
-              <a:rPr lang="es-MX" sz="3200" dirty="0" err="1"/>
-              <a:t>embeddings</a:t>
-            </a:r>
-            <a:r>
-              <a:rPr lang="es-MX" sz="3200" dirty="0"/>
-              <a:t> como estándar innovador.</a:t>
+              <a:t>Seguridad reforzada con Microsoft Entra ID.</a:t>
             </a:r>
           </a:p>
           <a:p>
@@ -10985,17 +11025,17 @@
             </a:pPr>
             <a:r>
               <a:rPr lang="es-MX" sz="3200" dirty="0"/>
-              <a:t>Resultados superiores a métodos convencionales.</a:t>
-            </a:r>
-          </a:p>
-        </p:txBody>
-      </p:sp>
-      <p:sp>
-        <p:nvSpPr>
-          <p:cNvPr id="5" name="Título 4">
-            <a:extLst>
-              <a:ext uri="{FF2B5EF4-FFF2-40B4-BE49-F238E27FC236}">
-                <a16:creationId xmlns:a16="http://schemas.microsoft.com/office/drawing/2014/main" id="{E3B02473-7963-64B9-DA47-9DCF3E257BE9}"/>
+              <a:t>Mejora experiencia empleados y eficiencia RH.</a:t>
+            </a:r>
+          </a:p>
+        </p:txBody>
+      </p:sp>
+      <p:sp>
+        <p:nvSpPr>
+          <p:cNvPr id="5" name="Marcador de fecha 4">
+            <a:extLst>
+              <a:ext uri="{FF2B5EF4-FFF2-40B4-BE49-F238E27FC236}">
+                <a16:creationId xmlns:a16="http://schemas.microsoft.com/office/drawing/2014/main" id="{A5558EC8-446A-0A66-D5B2-125F27705568}"/>
               </a:ext>
             </a:extLst>
           </p:cNvPr>
@@ -11003,7 +11043,7 @@
             <a:spLocks noGrp="1"/>
           </p:cNvSpPr>
           <p:nvPr>
-            <p:ph type="title"/>
+            <p:ph type="dt" sz="half" idx="13"/>
           </p:nvPr>
         </p:nvSpPr>
         <p:spPr/>
@@ -11011,17 +11051,73 @@
           <a:bodyPr/>
           <a:lstStyle/>
           <a:p>
-            <a:r>
-              <a:rPr lang="es-MX" dirty="0"/>
-              <a:t>Conclusiones</a:t>
-            </a:r>
-          </a:p>
-        </p:txBody>
-      </p:sp>
+            <a:fld id="{3EDC3FF3-DCBA-4A3D-ABB5-DDC87A3BC009}" type="datetime1">
+              <a:rPr lang="es-CO" smtClean="0"/>
+              <a:t>31/05/2025</a:t>
+            </a:fld>
+            <a:endParaRPr lang="es-CO"/>
+          </a:p>
+        </p:txBody>
+      </p:sp>
+      <p:sp>
+        <p:nvSpPr>
+          <p:cNvPr id="6" name="Marcador de pie de página 5">
+            <a:extLst>
+              <a:ext uri="{FF2B5EF4-FFF2-40B4-BE49-F238E27FC236}">
+                <a16:creationId xmlns:a16="http://schemas.microsoft.com/office/drawing/2014/main" id="{FB6F8A0B-45A3-1C7B-8FC1-D31C85259A04}"/>
+              </a:ext>
+            </a:extLst>
+          </p:cNvPr>
+          <p:cNvSpPr>
+            <a:spLocks noGrp="1"/>
+          </p:cNvSpPr>
+          <p:nvPr>
+            <p:ph type="ftr" sz="quarter" idx="14"/>
+          </p:nvPr>
+        </p:nvSpPr>
+        <p:spPr/>
+        <p:txBody>
+          <a:bodyPr/>
+          <a:lstStyle/>
+          <a:p>
+            <a:endParaRPr lang="es-CO" dirty="0"/>
+          </a:p>
+        </p:txBody>
+      </p:sp>
+      <p:pic>
+        <p:nvPicPr>
+          <p:cNvPr id="8" name="Picture 3" descr="beneficios_empresa.png">
+            <a:extLst>
+              <a:ext uri="{FF2B5EF4-FFF2-40B4-BE49-F238E27FC236}">
+                <a16:creationId xmlns:a16="http://schemas.microsoft.com/office/drawing/2014/main" id="{A3668CB4-6E8B-7E29-C1F6-0E2DB80F1B89}"/>
+              </a:ext>
+            </a:extLst>
+          </p:cNvPr>
+          <p:cNvPicPr>
+            <a:picLocks noChangeAspect="1"/>
+          </p:cNvPicPr>
+          <p:nvPr/>
+        </p:nvPicPr>
+        <p:blipFill>
+          <a:blip r:embed="rId2"/>
+          <a:stretch>
+            <a:fillRect/>
+          </a:stretch>
+        </p:blipFill>
+        <p:spPr>
+          <a:xfrm>
+            <a:off x="6379331" y="1924844"/>
+            <a:ext cx="5504692" cy="2752346"/>
+          </a:xfrm>
+          <a:prstGeom prst="rect">
+            <a:avLst/>
+          </a:prstGeom>
+        </p:spPr>
+      </p:pic>
     </p:spTree>
     <p:extLst>
       <p:ext uri="{BB962C8B-B14F-4D97-AF65-F5344CB8AC3E}">
-        <p14:creationId xmlns:p14="http://schemas.microsoft.com/office/powerpoint/2010/main" val="1739040261"/>
+        <p14:creationId xmlns:p14="http://schemas.microsoft.com/office/powerpoint/2010/main" val="3913682475"/>
       </p:ext>
     </p:extLst>
   </p:cSld>
@@ -11050,6 +11146,178 @@
       </p:grpSpPr>
       <p:sp>
         <p:nvSpPr>
+          <p:cNvPr id="2" name="Marcador de fecha 1">
+            <a:extLst>
+              <a:ext uri="{FF2B5EF4-FFF2-40B4-BE49-F238E27FC236}">
+                <a16:creationId xmlns:a16="http://schemas.microsoft.com/office/drawing/2014/main" id="{DDFD761B-D19F-8CA1-9BD4-F4EB7009DEB7}"/>
+              </a:ext>
+            </a:extLst>
+          </p:cNvPr>
+          <p:cNvSpPr>
+            <a:spLocks noGrp="1"/>
+          </p:cNvSpPr>
+          <p:nvPr>
+            <p:ph type="dt" sz="half" idx="10"/>
+          </p:nvPr>
+        </p:nvSpPr>
+        <p:spPr/>
+        <p:txBody>
+          <a:bodyPr/>
+          <a:lstStyle/>
+          <a:p>
+            <a:fld id="{9EB637D8-29A0-4E8C-B8A6-C66707785733}" type="datetime1">
+              <a:rPr lang="es-CO" smtClean="0"/>
+              <a:t>31/05/2025</a:t>
+            </a:fld>
+            <a:endParaRPr lang="es-CO"/>
+          </a:p>
+        </p:txBody>
+      </p:sp>
+      <p:sp>
+        <p:nvSpPr>
+          <p:cNvPr id="3" name="Marcador de pie de página 2">
+            <a:extLst>
+              <a:ext uri="{FF2B5EF4-FFF2-40B4-BE49-F238E27FC236}">
+                <a16:creationId xmlns:a16="http://schemas.microsoft.com/office/drawing/2014/main" id="{289877D8-29FA-CB5E-43AE-01873140A27B}"/>
+              </a:ext>
+            </a:extLst>
+          </p:cNvPr>
+          <p:cNvSpPr>
+            <a:spLocks noGrp="1"/>
+          </p:cNvSpPr>
+          <p:nvPr>
+            <p:ph type="ftr" sz="quarter" idx="11"/>
+          </p:nvPr>
+        </p:nvSpPr>
+        <p:spPr/>
+        <p:txBody>
+          <a:bodyPr/>
+          <a:lstStyle/>
+          <a:p>
+            <a:endParaRPr lang="es-CO"/>
+          </a:p>
+        </p:txBody>
+      </p:sp>
+      <p:sp>
+        <p:nvSpPr>
+          <p:cNvPr id="4" name="Marcador de texto 3">
+            <a:extLst>
+              <a:ext uri="{FF2B5EF4-FFF2-40B4-BE49-F238E27FC236}">
+                <a16:creationId xmlns:a16="http://schemas.microsoft.com/office/drawing/2014/main" id="{6866D828-883D-E7A2-96C9-549CB32DF939}"/>
+              </a:ext>
+            </a:extLst>
+          </p:cNvPr>
+          <p:cNvSpPr>
+            <a:spLocks noGrp="1"/>
+          </p:cNvSpPr>
+          <p:nvPr>
+            <p:ph type="body" sz="quarter" idx="12"/>
+          </p:nvPr>
+        </p:nvSpPr>
+        <p:spPr/>
+        <p:txBody>
+          <a:bodyPr/>
+          <a:lstStyle/>
+          <a:p>
+            <a:pPr marL="342900" indent="-342900">
+              <a:buFont typeface="Arial" panose="020B0604020202020204" pitchFamily="34" charset="0"/>
+              <a:buChar char="•"/>
+            </a:pPr>
+            <a:r>
+              <a:rPr lang="es-MX" sz="3200" dirty="0"/>
+              <a:t>Chatbot eficaz para automatizar consultas de nómina.</a:t>
+            </a:r>
+          </a:p>
+          <a:p>
+            <a:pPr marL="342900" indent="-342900">
+              <a:buFont typeface="Arial" panose="020B0604020202020204" pitchFamily="34" charset="0"/>
+              <a:buChar char="•"/>
+            </a:pPr>
+            <a:r>
+              <a:rPr lang="es-MX" sz="3200" dirty="0"/>
+              <a:t>Integración de PLN y </a:t>
+            </a:r>
+            <a:r>
+              <a:rPr lang="es-MX" sz="3200" dirty="0" err="1"/>
+              <a:t>embeddings</a:t>
+            </a:r>
+            <a:r>
+              <a:rPr lang="es-MX" sz="3200" dirty="0"/>
+              <a:t> como estándar innovador.</a:t>
+            </a:r>
+          </a:p>
+          <a:p>
+            <a:pPr marL="342900" indent="-342900">
+              <a:buFont typeface="Arial" panose="020B0604020202020204" pitchFamily="34" charset="0"/>
+              <a:buChar char="•"/>
+            </a:pPr>
+            <a:r>
+              <a:rPr lang="es-MX" sz="3200" dirty="0"/>
+              <a:t>Resultados superiores a métodos convencionales.</a:t>
+            </a:r>
+          </a:p>
+        </p:txBody>
+      </p:sp>
+      <p:sp>
+        <p:nvSpPr>
+          <p:cNvPr id="5" name="Título 4">
+            <a:extLst>
+              <a:ext uri="{FF2B5EF4-FFF2-40B4-BE49-F238E27FC236}">
+                <a16:creationId xmlns:a16="http://schemas.microsoft.com/office/drawing/2014/main" id="{E3B02473-7963-64B9-DA47-9DCF3E257BE9}"/>
+              </a:ext>
+            </a:extLst>
+          </p:cNvPr>
+          <p:cNvSpPr>
+            <a:spLocks noGrp="1"/>
+          </p:cNvSpPr>
+          <p:nvPr>
+            <p:ph type="title"/>
+          </p:nvPr>
+        </p:nvSpPr>
+        <p:spPr/>
+        <p:txBody>
+          <a:bodyPr/>
+          <a:lstStyle/>
+          <a:p>
+            <a:r>
+              <a:rPr lang="es-MX" dirty="0"/>
+              <a:t>Conclusiones</a:t>
+            </a:r>
+          </a:p>
+        </p:txBody>
+      </p:sp>
+    </p:spTree>
+    <p:extLst>
+      <p:ext uri="{BB962C8B-B14F-4D97-AF65-F5344CB8AC3E}">
+        <p14:creationId xmlns:p14="http://schemas.microsoft.com/office/powerpoint/2010/main" val="1739040261"/>
+      </p:ext>
+    </p:extLst>
+  </p:cSld>
+  <p:clrMapOvr>
+    <a:masterClrMapping/>
+  </p:clrMapOvr>
+</p:sld>
+</file>
+
+<file path=ppt/slides/slide15.xml><?xml version="1.0" encoding="utf-8"?>
+<p:sld xmlns:a="http://schemas.openxmlformats.org/drawingml/2006/main" xmlns:r="http://schemas.openxmlformats.org/officeDocument/2006/relationships" xmlns:p="http://schemas.openxmlformats.org/presentationml/2006/main">
+  <p:cSld>
+    <p:spTree>
+      <p:nvGrpSpPr>
+        <p:cNvPr id="1" name=""/>
+        <p:cNvGrpSpPr/>
+        <p:nvPr/>
+      </p:nvGrpSpPr>
+      <p:grpSpPr>
+        <a:xfrm>
+          <a:off x="0" y="0"/>
+          <a:ext cx="0" cy="0"/>
+          <a:chOff x="0" y="0"/>
+          <a:chExt cx="0" cy="0"/>
+        </a:xfrm>
+      </p:grpSpPr>
+      <p:sp>
+        <p:nvSpPr>
           <p:cNvPr id="2" name="Título 1">
             <a:extLst>
               <a:ext uri="{FF2B5EF4-FFF2-40B4-BE49-F238E27FC236}">
@@ -11174,7 +11442,7 @@
 </p:sld>
 </file>
 
-<file path=ppt/slides/slide15.xml><?xml version="1.0" encoding="utf-8"?>
+<file path=ppt/slides/slide16.xml><?xml version="1.0" encoding="utf-8"?>
 <p:sld xmlns:a="http://schemas.openxmlformats.org/drawingml/2006/main" xmlns:r="http://schemas.openxmlformats.org/officeDocument/2006/relationships" xmlns:p="http://schemas.openxmlformats.org/presentationml/2006/main">
   <p:cSld>
     <p:spTree>
@@ -11541,7 +11809,7 @@
           <a:p>
             <a:fld id="{ED0F19C8-A088-45FE-A2B2-A7D0E0963BA1}" type="datetime1">
               <a:rPr lang="es-CO" smtClean="0"/>
-              <a:t>30/05/2025</a:t>
+              <a:t>31/05/2025</a:t>
             </a:fld>
             <a:endParaRPr lang="es-CO"/>
           </a:p>
@@ -11627,15 +11895,7 @@
             </a:pPr>
             <a:r>
               <a:rPr lang="es-MX" sz="3200" dirty="0"/>
-              <a:t>Desarrollar </a:t>
-            </a:r>
-            <a:r>
-              <a:rPr lang="es-MX" sz="3200" dirty="0" err="1"/>
-              <a:t>chatbot</a:t>
-            </a:r>
-            <a:r>
-              <a:rPr lang="es-MX" sz="3200" dirty="0"/>
-              <a:t> para responder consultas de nómina con precisión y seguridad.</a:t>
+              <a:t>Desarrollar chatbot para responder consultas de nómina con precisión y seguridad.</a:t>
             </a:r>
           </a:p>
           <a:p>
@@ -11665,15 +11925,7 @@
             </a:pPr>
             <a:r>
               <a:rPr lang="es-MX" sz="3200" dirty="0"/>
-              <a:t>Utilizar PLN y </a:t>
-            </a:r>
-            <a:r>
-              <a:rPr lang="es-MX" sz="3200" dirty="0" err="1"/>
-              <a:t>embeddings</a:t>
-            </a:r>
-            <a:r>
-              <a:rPr lang="es-MX" sz="3200" dirty="0"/>
-              <a:t> para búsqueda semántica y contexto.</a:t>
+              <a:t>Utilizar PLN y embeddings para búsqueda semántica y contexto.</a:t>
             </a:r>
           </a:p>
         </p:txBody>
@@ -11731,7 +11983,7 @@
           <a:p>
             <a:fld id="{8CAE5C4D-619B-4AF9-89E5-81C270D52AD9}" type="datetime1">
               <a:rPr lang="es-CO" smtClean="0"/>
-              <a:t>30/05/2025</a:t>
+              <a:t>31/05/2025</a:t>
             </a:fld>
             <a:endParaRPr lang="es-CO"/>
           </a:p>
@@ -11781,7 +12033,7 @@
         <p:spPr>
           <a:xfrm>
             <a:off x="304801" y="2208628"/>
-            <a:ext cx="9093723" cy="3995224"/>
+            <a:ext cx="6614473" cy="3995224"/>
           </a:xfrm>
         </p:spPr>
         <p:txBody>
@@ -11793,7 +12045,7 @@
               <a:buChar char="•"/>
             </a:pPr>
             <a:r>
-              <a:rPr lang="es-MX" sz="2800" dirty="0"/>
+              <a:rPr lang="es-MX" sz="2400" dirty="0"/>
               <a:t>Usuario realiza consulta → Chatbot procesa la pregunta.</a:t>
             </a:r>
           </a:p>
@@ -11803,7 +12055,7 @@
               <a:buChar char="•"/>
             </a:pPr>
             <a:r>
-              <a:rPr lang="es-MX" sz="2800" dirty="0"/>
+              <a:rPr lang="es-MX" sz="2400" dirty="0"/>
               <a:t>Autenticación mediante Microsoft Entra ID.</a:t>
             </a:r>
           </a:p>
@@ -11813,7 +12065,7 @@
               <a:buChar char="•"/>
             </a:pPr>
             <a:r>
-              <a:rPr lang="es-MX" sz="2800" dirty="0"/>
+              <a:rPr lang="es-MX" sz="2400" dirty="0"/>
               <a:t>Consulta documentos en SharePoint.</a:t>
             </a:r>
           </a:p>
@@ -11823,32 +12075,8 @@
               <a:buChar char="•"/>
             </a:pPr>
             <a:r>
-              <a:rPr lang="es-MX" sz="2800" dirty="0"/>
-              <a:t>Búsqueda con </a:t>
-            </a:r>
-            <a:r>
-              <a:rPr lang="es-MX" sz="2800" dirty="0" err="1"/>
-              <a:t>embeddings</a:t>
-            </a:r>
-            <a:r>
-              <a:rPr lang="es-MX" sz="2800" dirty="0"/>
-              <a:t> semánticos (</a:t>
-            </a:r>
-            <a:r>
-              <a:rPr lang="es-MX" sz="2800" dirty="0" err="1"/>
-              <a:t>ChromaDB</a:t>
-            </a:r>
-            <a:r>
-              <a:rPr lang="es-MX" sz="2800" dirty="0"/>
-              <a:t> + </a:t>
-            </a:r>
-            <a:r>
-              <a:rPr lang="es-MX" sz="2800" dirty="0" err="1"/>
-              <a:t>Sentence</a:t>
-            </a:r>
-            <a:r>
-              <a:rPr lang="es-MX" sz="2800" dirty="0"/>
-              <a:t>-Transformers).</a:t>
+              <a:rPr lang="es-MX" sz="2400" dirty="0"/>
+              <a:t>Búsqueda con embeddings semánticos (ChromaDB + Sentence-Transformers).</a:t>
             </a:r>
           </a:p>
           <a:p>
@@ -11857,20 +12085,12 @@
               <a:buChar char="•"/>
             </a:pPr>
             <a:r>
-              <a:rPr lang="es-MX" sz="2800" dirty="0"/>
-              <a:t>Modelo PLN (</a:t>
-            </a:r>
-            <a:r>
-              <a:rPr lang="es-MX" sz="2800" dirty="0" err="1"/>
-              <a:t>DistilBERT</a:t>
-            </a:r>
-            <a:r>
-              <a:rPr lang="es-MX" sz="2800" dirty="0"/>
-              <a:t>) responde contextualizado.</a:t>
-            </a:r>
-          </a:p>
-          <a:p>
-            <a:endParaRPr lang="es-MX" sz="2800" dirty="0"/>
+              <a:rPr lang="es-MX" sz="2400" dirty="0"/>
+              <a:t>Modelo PLN (DistilBERT) responde contextualizado.</a:t>
+            </a:r>
+          </a:p>
+          <a:p>
+            <a:endParaRPr lang="es-MX" sz="2400" dirty="0"/>
           </a:p>
         </p:txBody>
       </p:sp>
@@ -11904,10 +12124,10 @@
       </p:sp>
       <p:pic>
         <p:nvPicPr>
-          <p:cNvPr id="7" name="Imagen 6">
-            <a:extLst>
-              <a:ext uri="{FF2B5EF4-FFF2-40B4-BE49-F238E27FC236}">
-                <a16:creationId xmlns:a16="http://schemas.microsoft.com/office/drawing/2014/main" id="{65567A9A-9021-F6F4-1CD2-A92104CC25E3}"/>
+          <p:cNvPr id="6" name="Imagen 5" descr="Diagrama&#10;&#10;El contenido generado por IA puede ser incorrecto.">
+            <a:extLst>
+              <a:ext uri="{FF2B5EF4-FFF2-40B4-BE49-F238E27FC236}">
+                <a16:creationId xmlns:a16="http://schemas.microsoft.com/office/drawing/2014/main" id="{6F737CEE-AC53-3D28-BD62-9D352380269D}"/>
               </a:ext>
             </a:extLst>
           </p:cNvPr>
@@ -11916,20 +12136,27 @@
           </p:cNvPicPr>
           <p:nvPr/>
         </p:nvPicPr>
-        <p:blipFill>
+        <p:blipFill rotWithShape="1">
           <a:blip r:embed="rId2"/>
-          <a:stretch>
-            <a:fillRect/>
-          </a:stretch>
+          <a:srcRect l="3167" t="6361" r="3178" b="1590"/>
+          <a:stretch/>
         </p:blipFill>
-        <p:spPr>
-          <a:xfrm>
-            <a:off x="8892822" y="2865052"/>
-            <a:ext cx="2616716" cy="1127895"/>
-          </a:xfrm>
-          <a:prstGeom prst="rect">
-            <a:avLst/>
-          </a:prstGeom>
+        <p:spPr bwMode="auto">
+          <a:xfrm>
+            <a:off x="6919274" y="2004021"/>
+            <a:ext cx="4848344" cy="3995224"/>
+          </a:xfrm>
+          <a:prstGeom prst="rect">
+            <a:avLst/>
+          </a:prstGeom>
+          <a:ln>
+            <a:noFill/>
+          </a:ln>
+          <a:extLst>
+            <a:ext uri="{53640926-AAD7-44D8-BBD7-CCE9431645EC}">
+              <a14:shadowObscured xmlns:a14="http://schemas.microsoft.com/office/drawing/2010/main"/>
+            </a:ext>
+          </a:extLst>
         </p:spPr>
       </p:pic>
     </p:spTree>
@@ -12511,7 +12738,7 @@
           <a:p>
             <a:fld id="{1178557B-8C7A-4A2E-8300-583C0C4A3047}" type="datetime1">
               <a:rPr lang="es-CO" smtClean="0"/>
-              <a:t>30/05/2025</a:t>
+              <a:t>31/05/2025</a:t>
             </a:fld>
             <a:endParaRPr lang="es-CO"/>
           </a:p>
@@ -12712,10 +12939,64 @@
       </p:grpSpPr>
       <p:sp>
         <p:nvSpPr>
-          <p:cNvPr id="3" name="Título 2">
-            <a:extLst>
-              <a:ext uri="{FF2B5EF4-FFF2-40B4-BE49-F238E27FC236}">
-                <a16:creationId xmlns:a16="http://schemas.microsoft.com/office/drawing/2014/main" id="{0B96A6D9-91EA-0394-CC6D-6C90A710047A}"/>
+          <p:cNvPr id="2" name="Marcador de fecha 1">
+            <a:extLst>
+              <a:ext uri="{FF2B5EF4-FFF2-40B4-BE49-F238E27FC236}">
+                <a16:creationId xmlns:a16="http://schemas.microsoft.com/office/drawing/2014/main" id="{10FE9F0F-716F-90A6-0E58-261D484EDF60}"/>
+              </a:ext>
+            </a:extLst>
+          </p:cNvPr>
+          <p:cNvSpPr>
+            <a:spLocks noGrp="1"/>
+          </p:cNvSpPr>
+          <p:nvPr>
+            <p:ph type="dt" sz="half" idx="10"/>
+          </p:nvPr>
+        </p:nvSpPr>
+        <p:spPr/>
+        <p:txBody>
+          <a:bodyPr/>
+          <a:lstStyle/>
+          <a:p>
+            <a:fld id="{BE571492-7681-42F6-9397-53FF3BF4629C}" type="datetime1">
+              <a:rPr lang="es-CO" smtClean="0"/>
+              <a:t>31/05/2025</a:t>
+            </a:fld>
+            <a:endParaRPr lang="es-CO"/>
+          </a:p>
+        </p:txBody>
+      </p:sp>
+      <p:sp>
+        <p:nvSpPr>
+          <p:cNvPr id="3" name="Marcador de pie de página 2">
+            <a:extLst>
+              <a:ext uri="{FF2B5EF4-FFF2-40B4-BE49-F238E27FC236}">
+                <a16:creationId xmlns:a16="http://schemas.microsoft.com/office/drawing/2014/main" id="{97C4CA22-C1B9-642C-4130-231F94F9B19D}"/>
+              </a:ext>
+            </a:extLst>
+          </p:cNvPr>
+          <p:cNvSpPr>
+            <a:spLocks noGrp="1"/>
+          </p:cNvSpPr>
+          <p:nvPr>
+            <p:ph type="ftr" sz="quarter" idx="11"/>
+          </p:nvPr>
+        </p:nvSpPr>
+        <p:spPr/>
+        <p:txBody>
+          <a:bodyPr/>
+          <a:lstStyle/>
+          <a:p>
+            <a:endParaRPr lang="es-CO"/>
+          </a:p>
+        </p:txBody>
+      </p:sp>
+      <p:sp>
+        <p:nvSpPr>
+          <p:cNvPr id="5" name="Título 4">
+            <a:extLst>
+              <a:ext uri="{FF2B5EF4-FFF2-40B4-BE49-F238E27FC236}">
+                <a16:creationId xmlns:a16="http://schemas.microsoft.com/office/drawing/2014/main" id="{BBA7839E-85C9-EB9C-4099-C12E4867BDD2}"/>
               </a:ext>
             </a:extLst>
           </p:cNvPr>
@@ -12733,112 +13014,17 @@
           <a:p>
             <a:r>
               <a:rPr lang="es-MX" dirty="0"/>
-              <a:t>Evaluación: Métricas y Resultados</a:t>
-            </a:r>
-          </a:p>
-        </p:txBody>
-      </p:sp>
-      <p:sp>
-        <p:nvSpPr>
-          <p:cNvPr id="4" name="Marcador de texto 3">
-            <a:extLst>
-              <a:ext uri="{FF2B5EF4-FFF2-40B4-BE49-F238E27FC236}">
-                <a16:creationId xmlns:a16="http://schemas.microsoft.com/office/drawing/2014/main" id="{4A11DB47-998D-7A1E-E149-B28298ED46A5}"/>
-              </a:ext>
-            </a:extLst>
-          </p:cNvPr>
-          <p:cNvSpPr>
-            <a:spLocks noGrp="1"/>
-          </p:cNvSpPr>
-          <p:nvPr>
-            <p:ph type="body" sz="quarter" idx="12"/>
-          </p:nvPr>
-        </p:nvSpPr>
-        <p:spPr>
-          <a:xfrm>
-            <a:off x="7036136" y="1586132"/>
-            <a:ext cx="5058164" cy="3685735"/>
-          </a:xfrm>
-        </p:spPr>
-        <p:txBody>
-          <a:bodyPr/>
-          <a:lstStyle/>
-          <a:p>
-            <a:r>
-              <a:rPr lang="es-MX" dirty="0">
-                <a:solidFill>
-                  <a:schemeClr val="bg1"/>
-                </a:solidFill>
-              </a:rPr>
-              <a:t>Precisión general: 92%.</a:t>
-            </a:r>
-          </a:p>
-          <a:p>
-            <a:r>
-              <a:rPr lang="es-MX" dirty="0">
-                <a:solidFill>
-                  <a:schemeClr val="bg1"/>
-                </a:solidFill>
-              </a:rPr>
-              <a:t>Tiempo promedio de respuesta: 2.3 segundos.</a:t>
-            </a:r>
-          </a:p>
-          <a:p>
-            <a:r>
-              <a:rPr lang="es-MX" dirty="0">
-                <a:solidFill>
-                  <a:schemeClr val="bg1"/>
-                </a:solidFill>
-              </a:rPr>
-              <a:t>Precisión tradicional: 65%, tiempo: 3.8 segundos.</a:t>
-            </a:r>
-          </a:p>
-          <a:p>
-            <a:endParaRPr lang="es-MX" dirty="0">
-              <a:solidFill>
-                <a:schemeClr val="bg1"/>
-              </a:solidFill>
-            </a:endParaRPr>
+              <a:t>Flujo de información</a:t>
+            </a:r>
           </a:p>
         </p:txBody>
       </p:sp>
       <p:pic>
         <p:nvPicPr>
-          <p:cNvPr id="5" name="Picture 3" descr="desempeno_comparacion.png">
-            <a:extLst>
-              <a:ext uri="{FF2B5EF4-FFF2-40B4-BE49-F238E27FC236}">
-                <a16:creationId xmlns:a16="http://schemas.microsoft.com/office/drawing/2014/main" id="{5B8AD368-4797-7BED-8863-3EE2699233FA}"/>
-              </a:ext>
-            </a:extLst>
-          </p:cNvPr>
-          <p:cNvPicPr>
-            <a:picLocks noGrp="1" noChangeAspect="1"/>
-          </p:cNvPicPr>
-          <p:nvPr>
-            <p:ph type="pic" sz="quarter" idx="13"/>
-          </p:nvPr>
-        </p:nvPicPr>
-        <p:blipFill>
-          <a:blip r:embed="rId2"/>
-          <a:srcRect t="980" b="1787"/>
-          <a:stretch/>
-        </p:blipFill>
-        <p:spPr>
-          <a:xfrm>
-            <a:off x="981075" y="2413262"/>
-            <a:ext cx="5787369" cy="4006391"/>
-          </a:xfrm>
-          <a:prstGeom prst="rect">
-            <a:avLst/>
-          </a:prstGeom>
-        </p:spPr>
-      </p:pic>
-      <p:pic>
-        <p:nvPicPr>
-          <p:cNvPr id="7" name="Imagen 6">
-            <a:extLst>
-              <a:ext uri="{FF2B5EF4-FFF2-40B4-BE49-F238E27FC236}">
-                <a16:creationId xmlns:a16="http://schemas.microsoft.com/office/drawing/2014/main" id="{712D7EBF-A0DC-1307-8779-B4DF924F5EC6}"/>
+          <p:cNvPr id="6" name="Imagen 5" descr="Diagrama&#10;&#10;El contenido generado por IA puede ser incorrecto.">
+            <a:extLst>
+              <a:ext uri="{FF2B5EF4-FFF2-40B4-BE49-F238E27FC236}">
+                <a16:creationId xmlns:a16="http://schemas.microsoft.com/office/drawing/2014/main" id="{996F3551-F312-C02E-0C30-563646718CE6}"/>
               </a:ext>
             </a:extLst>
           </p:cNvPr>
@@ -12848,15 +13034,15 @@
           <p:nvPr/>
         </p:nvPicPr>
         <p:blipFill>
-          <a:blip r:embed="rId3"/>
+          <a:blip r:embed="rId2"/>
           <a:stretch>
             <a:fillRect/>
           </a:stretch>
         </p:blipFill>
         <p:spPr>
           <a:xfrm>
-            <a:off x="7709809" y="3933281"/>
-            <a:ext cx="3858163" cy="2486372"/>
+            <a:off x="2970212" y="2168207"/>
+            <a:ext cx="5943600" cy="3778885"/>
           </a:xfrm>
           <a:prstGeom prst="rect">
             <a:avLst/>
@@ -12866,7 +13052,7 @@
     </p:spTree>
     <p:extLst>
       <p:ext uri="{BB962C8B-B14F-4D97-AF65-F5344CB8AC3E}">
-        <p14:creationId xmlns:p14="http://schemas.microsoft.com/office/powerpoint/2010/main" val="3890542687"/>
+        <p14:creationId xmlns:p14="http://schemas.microsoft.com/office/powerpoint/2010/main" val="1350728"/>
       </p:ext>
     </p:extLst>
   </p:cSld>
@@ -14398,15 +14584,6 @@
 </file>
 
 <file path=customXml/item1.xml><?xml version="1.0" encoding="utf-8"?>
-<?mso-contentType ?>
-<FormTemplates xmlns="http://schemas.microsoft.com/sharepoint/v3/contenttype/forms">
-  <Display>DocumentLibraryForm</Display>
-  <Edit>DocumentLibraryForm</Edit>
-  <New>DocumentLibraryForm</New>
-</FormTemplates>
-</file>
-
-<file path=customXml/item2.xml><?xml version="1.0" encoding="utf-8"?>
 <ct:contentTypeSchema xmlns:ct="http://schemas.microsoft.com/office/2006/metadata/contentType" xmlns:ma="http://schemas.microsoft.com/office/2006/metadata/properties/metaAttributes" ct:_="" ma:_="" ma:contentTypeName="Document" ma:contentTypeID="0x0101000DE64AEEDD9B7A4D93545ACBE97D4615" ma:contentTypeVersion="2" ma:contentTypeDescription="Create a new document." ma:contentTypeScope="" ma:versionID="f49002b78e3a4a71b814eef46a983816">
   <xsd:schema xmlns:xsd="http://www.w3.org/2001/XMLSchema" xmlns:xs="http://www.w3.org/2001/XMLSchema" xmlns:p="http://schemas.microsoft.com/office/2006/metadata/properties" xmlns:ns2="http://schemas.microsoft.com/sharepoint/v3/fields" targetNamespace="http://schemas.microsoft.com/office/2006/metadata/properties" ma:root="true" ma:fieldsID="38f6db2dd0d9a0cf6a8dc37be32b365b" ns2:_="">
     <xsd:import namespace="http://schemas.microsoft.com/sharepoint/v3/fields"/>
@@ -14550,6 +14727,15 @@
 </ct:contentTypeSchema>
 </file>
 
+<file path=customXml/item2.xml><?xml version="1.0" encoding="utf-8"?>
+<?mso-contentType ?>
+<FormTemplates xmlns="http://schemas.microsoft.com/sharepoint/v3/contenttype/forms">
+  <Display>DocumentLibraryForm</Display>
+  <Edit>DocumentLibraryForm</Edit>
+  <New>DocumentLibraryForm</New>
+</FormTemplates>
+</file>
+
 <file path=customXml/item3.xml><?xml version="1.0" encoding="utf-8"?>
 <p:properties xmlns:p="http://schemas.microsoft.com/office/2006/metadata/properties" xmlns:xsi="http://www.w3.org/2001/XMLSchema-instance" xmlns:pc="http://schemas.microsoft.com/office/infopath/2007/PartnerControls">
   <documentManagement>
@@ -14560,14 +14746,6 @@
 </file>
 
 <file path=customXml/itemProps1.xml><?xml version="1.0" encoding="utf-8"?>
-<ds:datastoreItem xmlns:ds="http://schemas.openxmlformats.org/officeDocument/2006/customXml" ds:itemID="{87D2A1B0-FF3E-4009-940D-AED0EB70AA20}">
-  <ds:schemaRefs>
-    <ds:schemaRef ds:uri="http://schemas.microsoft.com/sharepoint/v3/contenttype/forms"/>
-  </ds:schemaRefs>
-</ds:datastoreItem>
-</file>
-
-<file path=customXml/itemProps2.xml><?xml version="1.0" encoding="utf-8"?>
 <ds:datastoreItem xmlns:ds="http://schemas.openxmlformats.org/officeDocument/2006/customXml" ds:itemID="{E4214858-785C-42F7-BE66-6D0E79395FC8}">
   <ds:schemaRefs>
     <ds:schemaRef ds:uri="http://schemas.microsoft.com/office/2006/metadata/contentType"/>
@@ -14581,6 +14759,14 @@
     <ds:schemaRef ds:uri="http://purl.org/dc/elements/1.1/"/>
     <ds:schemaRef ds:uri="http://purl.org/dc/terms/"/>
     <ds:schemaRef ds:uri="http://schemas.microsoft.com/internal/obd"/>
+  </ds:schemaRefs>
+</ds:datastoreItem>
+</file>
+
+<file path=customXml/itemProps2.xml><?xml version="1.0" encoding="utf-8"?>
+<ds:datastoreItem xmlns:ds="http://schemas.openxmlformats.org/officeDocument/2006/customXml" ds:itemID="{87D2A1B0-FF3E-4009-940D-AED0EB70AA20}">
+  <ds:schemaRefs>
+    <ds:schemaRef ds:uri="http://schemas.microsoft.com/sharepoint/v3/contenttype/forms"/>
   </ds:schemaRefs>
 </ds:datastoreItem>
 </file>

</xml_diff>